<commit_message>
adding very small updates on slide series on the web server
</commit_message>
<xml_diff>
--- a/app/public/assets/01/parsing2.pptx
+++ b/app/public/assets/01/parsing2.pptx
@@ -104,6 +104,22 @@
       </a:defRPr>
     </a:lvl9pPr>
   </p:defaultTextStyle>
+  <p:extLst>
+    <p:ext uri="{EFAFB233-063F-42B5-8137-9DF3F51BA10A}">
+      <p15:sldGuideLst xmlns:p15="http://schemas.microsoft.com/office/powerpoint/2012/main">
+        <p15:guide id="1" orient="horz" pos="2160">
+          <p15:clr>
+            <a:srgbClr val="A4A3A4"/>
+          </p15:clr>
+        </p15:guide>
+        <p15:guide id="2" pos="2880">
+          <p15:clr>
+            <a:srgbClr val="A4A3A4"/>
+          </p15:clr>
+        </p15:guide>
+      </p15:sldGuideLst>
+    </p:ext>
+  </p:extLst>
 </p:presentation>
 </file>
 
@@ -145,10 +161,9 @@
           <a:lstStyle/>
           <a:p>
             <a:r>
-              <a:rPr lang="nl-NL" smtClean="0"/>
+              <a:rPr lang="nl-NL"/>
               <a:t>Klik om de stijl te bewerken</a:t>
             </a:r>
-            <a:endParaRPr lang="nl-NL"/>
           </a:p>
         </p:txBody>
       </p:sp>
@@ -264,10 +279,9 @@
           </a:lstStyle>
           <a:p>
             <a:r>
-              <a:rPr lang="nl-NL" smtClean="0"/>
+              <a:rPr lang="nl-NL"/>
               <a:t>Klik om het opmaakprofiel van de modelondertitel te bewerken</a:t>
             </a:r>
-            <a:endParaRPr lang="nl-NL"/>
           </a:p>
         </p:txBody>
       </p:sp>
@@ -288,7 +302,7 @@
           <a:p>
             <a:fld id="{3D636C07-7E76-46D3-B86B-6AF7C60E533E}" type="datetimeFigureOut">
               <a:rPr lang="nl-NL" smtClean="0"/>
-              <a:t>26-10-2017</a:t>
+              <a:t>12-9-2022</a:t>
             </a:fld>
             <a:endParaRPr lang="nl-NL"/>
           </a:p>
@@ -330,7 +344,7 @@
           <a:p>
             <a:fld id="{A9096D49-DAE3-40DE-93E0-41688E0A5016}" type="slidenum">
               <a:rPr lang="nl-NL" smtClean="0"/>
-              <a:t>‹nr.›</a:t>
+              <a:t>‹#›</a:t>
             </a:fld>
             <a:endParaRPr lang="nl-NL"/>
           </a:p>
@@ -377,10 +391,9 @@
           <a:lstStyle/>
           <a:p>
             <a:r>
-              <a:rPr lang="nl-NL" smtClean="0"/>
+              <a:rPr lang="nl-NL"/>
               <a:t>Klik om de stijl te bewerken</a:t>
             </a:r>
-            <a:endParaRPr lang="nl-NL"/>
           </a:p>
         </p:txBody>
       </p:sp>
@@ -401,38 +414,37 @@
           <a:p>
             <a:pPr lvl="0"/>
             <a:r>
-              <a:rPr lang="nl-NL" smtClean="0"/>
+              <a:rPr lang="nl-NL"/>
               <a:t>Klik om de modelstijlen te bewerken</a:t>
             </a:r>
           </a:p>
           <a:p>
             <a:pPr lvl="1"/>
             <a:r>
-              <a:rPr lang="nl-NL" smtClean="0"/>
+              <a:rPr lang="nl-NL"/>
               <a:t>Tweede niveau</a:t>
             </a:r>
           </a:p>
           <a:p>
             <a:pPr lvl="2"/>
             <a:r>
-              <a:rPr lang="nl-NL" smtClean="0"/>
+              <a:rPr lang="nl-NL"/>
               <a:t>Derde niveau</a:t>
             </a:r>
           </a:p>
           <a:p>
             <a:pPr lvl="3"/>
             <a:r>
-              <a:rPr lang="nl-NL" smtClean="0"/>
+              <a:rPr lang="nl-NL"/>
               <a:t>Vierde niveau</a:t>
             </a:r>
           </a:p>
           <a:p>
             <a:pPr lvl="4"/>
             <a:r>
-              <a:rPr lang="nl-NL" smtClean="0"/>
+              <a:rPr lang="nl-NL"/>
               <a:t>Vijfde niveau</a:t>
             </a:r>
-            <a:endParaRPr lang="nl-NL"/>
           </a:p>
         </p:txBody>
       </p:sp>
@@ -453,7 +465,7 @@
           <a:p>
             <a:fld id="{3D636C07-7E76-46D3-B86B-6AF7C60E533E}" type="datetimeFigureOut">
               <a:rPr lang="nl-NL" smtClean="0"/>
-              <a:t>26-10-2017</a:t>
+              <a:t>12-9-2022</a:t>
             </a:fld>
             <a:endParaRPr lang="nl-NL"/>
           </a:p>
@@ -495,7 +507,7 @@
           <a:p>
             <a:fld id="{A9096D49-DAE3-40DE-93E0-41688E0A5016}" type="slidenum">
               <a:rPr lang="nl-NL" smtClean="0"/>
-              <a:t>‹nr.›</a:t>
+              <a:t>‹#›</a:t>
             </a:fld>
             <a:endParaRPr lang="nl-NL"/>
           </a:p>
@@ -547,10 +559,9 @@
           <a:lstStyle/>
           <a:p>
             <a:r>
-              <a:rPr lang="nl-NL" smtClean="0"/>
+              <a:rPr lang="nl-NL"/>
               <a:t>Klik om de stijl te bewerken</a:t>
             </a:r>
-            <a:endParaRPr lang="nl-NL"/>
           </a:p>
         </p:txBody>
       </p:sp>
@@ -576,38 +587,37 @@
           <a:p>
             <a:pPr lvl="0"/>
             <a:r>
-              <a:rPr lang="nl-NL" smtClean="0"/>
+              <a:rPr lang="nl-NL"/>
               <a:t>Klik om de modelstijlen te bewerken</a:t>
             </a:r>
           </a:p>
           <a:p>
             <a:pPr lvl="1"/>
             <a:r>
-              <a:rPr lang="nl-NL" smtClean="0"/>
+              <a:rPr lang="nl-NL"/>
               <a:t>Tweede niveau</a:t>
             </a:r>
           </a:p>
           <a:p>
             <a:pPr lvl="2"/>
             <a:r>
-              <a:rPr lang="nl-NL" smtClean="0"/>
+              <a:rPr lang="nl-NL"/>
               <a:t>Derde niveau</a:t>
             </a:r>
           </a:p>
           <a:p>
             <a:pPr lvl="3"/>
             <a:r>
-              <a:rPr lang="nl-NL" smtClean="0"/>
+              <a:rPr lang="nl-NL"/>
               <a:t>Vierde niveau</a:t>
             </a:r>
           </a:p>
           <a:p>
             <a:pPr lvl="4"/>
             <a:r>
-              <a:rPr lang="nl-NL" smtClean="0"/>
+              <a:rPr lang="nl-NL"/>
               <a:t>Vijfde niveau</a:t>
             </a:r>
-            <a:endParaRPr lang="nl-NL"/>
           </a:p>
         </p:txBody>
       </p:sp>
@@ -628,7 +638,7 @@
           <a:p>
             <a:fld id="{3D636C07-7E76-46D3-B86B-6AF7C60E533E}" type="datetimeFigureOut">
               <a:rPr lang="nl-NL" smtClean="0"/>
-              <a:t>26-10-2017</a:t>
+              <a:t>12-9-2022</a:t>
             </a:fld>
             <a:endParaRPr lang="nl-NL"/>
           </a:p>
@@ -670,7 +680,7 @@
           <a:p>
             <a:fld id="{A9096D49-DAE3-40DE-93E0-41688E0A5016}" type="slidenum">
               <a:rPr lang="nl-NL" smtClean="0"/>
-              <a:t>‹nr.›</a:t>
+              <a:t>‹#›</a:t>
             </a:fld>
             <a:endParaRPr lang="nl-NL"/>
           </a:p>
@@ -717,10 +727,9 @@
           <a:lstStyle/>
           <a:p>
             <a:r>
-              <a:rPr lang="nl-NL" smtClean="0"/>
+              <a:rPr lang="nl-NL"/>
               <a:t>Klik om de stijl te bewerken</a:t>
             </a:r>
-            <a:endParaRPr lang="nl-NL"/>
           </a:p>
         </p:txBody>
       </p:sp>
@@ -741,38 +750,37 @@
           <a:p>
             <a:pPr lvl="0"/>
             <a:r>
-              <a:rPr lang="nl-NL" smtClean="0"/>
+              <a:rPr lang="nl-NL"/>
               <a:t>Klik om de modelstijlen te bewerken</a:t>
             </a:r>
           </a:p>
           <a:p>
             <a:pPr lvl="1"/>
             <a:r>
-              <a:rPr lang="nl-NL" smtClean="0"/>
+              <a:rPr lang="nl-NL"/>
               <a:t>Tweede niveau</a:t>
             </a:r>
           </a:p>
           <a:p>
             <a:pPr lvl="2"/>
             <a:r>
-              <a:rPr lang="nl-NL" smtClean="0"/>
+              <a:rPr lang="nl-NL"/>
               <a:t>Derde niveau</a:t>
             </a:r>
           </a:p>
           <a:p>
             <a:pPr lvl="3"/>
             <a:r>
-              <a:rPr lang="nl-NL" smtClean="0"/>
+              <a:rPr lang="nl-NL"/>
               <a:t>Vierde niveau</a:t>
             </a:r>
           </a:p>
           <a:p>
             <a:pPr lvl="4"/>
             <a:r>
-              <a:rPr lang="nl-NL" smtClean="0"/>
+              <a:rPr lang="nl-NL"/>
               <a:t>Vijfde niveau</a:t>
             </a:r>
-            <a:endParaRPr lang="nl-NL"/>
           </a:p>
         </p:txBody>
       </p:sp>
@@ -793,7 +801,7 @@
           <a:p>
             <a:fld id="{3D636C07-7E76-46D3-B86B-6AF7C60E533E}" type="datetimeFigureOut">
               <a:rPr lang="nl-NL" smtClean="0"/>
-              <a:t>26-10-2017</a:t>
+              <a:t>12-9-2022</a:t>
             </a:fld>
             <a:endParaRPr lang="nl-NL"/>
           </a:p>
@@ -835,7 +843,7 @@
           <a:p>
             <a:fld id="{A9096D49-DAE3-40DE-93E0-41688E0A5016}" type="slidenum">
               <a:rPr lang="nl-NL" smtClean="0"/>
-              <a:t>‹nr.›</a:t>
+              <a:t>‹#›</a:t>
             </a:fld>
             <a:endParaRPr lang="nl-NL"/>
           </a:p>
@@ -891,10 +899,9 @@
           </a:lstStyle>
           <a:p>
             <a:r>
-              <a:rPr lang="nl-NL" smtClean="0"/>
+              <a:rPr lang="nl-NL"/>
               <a:t>Klik om de stijl te bewerken</a:t>
             </a:r>
-            <a:endParaRPr lang="nl-NL"/>
           </a:p>
         </p:txBody>
       </p:sp>
@@ -1011,7 +1018,7 @@
           <a:p>
             <a:pPr lvl="0"/>
             <a:r>
-              <a:rPr lang="nl-NL" smtClean="0"/>
+              <a:rPr lang="nl-NL"/>
               <a:t>Klik om de modelstijlen te bewerken</a:t>
             </a:r>
           </a:p>
@@ -1034,7 +1041,7 @@
           <a:p>
             <a:fld id="{3D636C07-7E76-46D3-B86B-6AF7C60E533E}" type="datetimeFigureOut">
               <a:rPr lang="nl-NL" smtClean="0"/>
-              <a:t>26-10-2017</a:t>
+              <a:t>12-9-2022</a:t>
             </a:fld>
             <a:endParaRPr lang="nl-NL"/>
           </a:p>
@@ -1076,7 +1083,7 @@
           <a:p>
             <a:fld id="{A9096D49-DAE3-40DE-93E0-41688E0A5016}" type="slidenum">
               <a:rPr lang="nl-NL" smtClean="0"/>
-              <a:t>‹nr.›</a:t>
+              <a:t>‹#›</a:t>
             </a:fld>
             <a:endParaRPr lang="nl-NL"/>
           </a:p>
@@ -1123,10 +1130,9 @@
           <a:lstStyle/>
           <a:p>
             <a:r>
-              <a:rPr lang="nl-NL" smtClean="0"/>
+              <a:rPr lang="nl-NL"/>
               <a:t>Klik om de stijl te bewerken</a:t>
             </a:r>
-            <a:endParaRPr lang="nl-NL"/>
           </a:p>
         </p:txBody>
       </p:sp>
@@ -1180,38 +1186,37 @@
           <a:p>
             <a:pPr lvl="0"/>
             <a:r>
-              <a:rPr lang="nl-NL" smtClean="0"/>
+              <a:rPr lang="nl-NL"/>
               <a:t>Klik om de modelstijlen te bewerken</a:t>
             </a:r>
           </a:p>
           <a:p>
             <a:pPr lvl="1"/>
             <a:r>
-              <a:rPr lang="nl-NL" smtClean="0"/>
+              <a:rPr lang="nl-NL"/>
               <a:t>Tweede niveau</a:t>
             </a:r>
           </a:p>
           <a:p>
             <a:pPr lvl="2"/>
             <a:r>
-              <a:rPr lang="nl-NL" smtClean="0"/>
+              <a:rPr lang="nl-NL"/>
               <a:t>Derde niveau</a:t>
             </a:r>
           </a:p>
           <a:p>
             <a:pPr lvl="3"/>
             <a:r>
-              <a:rPr lang="nl-NL" smtClean="0"/>
+              <a:rPr lang="nl-NL"/>
               <a:t>Vierde niveau</a:t>
             </a:r>
           </a:p>
           <a:p>
             <a:pPr lvl="4"/>
             <a:r>
-              <a:rPr lang="nl-NL" smtClean="0"/>
+              <a:rPr lang="nl-NL"/>
               <a:t>Vijfde niveau</a:t>
             </a:r>
-            <a:endParaRPr lang="nl-NL"/>
           </a:p>
         </p:txBody>
       </p:sp>
@@ -1265,38 +1270,37 @@
           <a:p>
             <a:pPr lvl="0"/>
             <a:r>
-              <a:rPr lang="nl-NL" smtClean="0"/>
+              <a:rPr lang="nl-NL"/>
               <a:t>Klik om de modelstijlen te bewerken</a:t>
             </a:r>
           </a:p>
           <a:p>
             <a:pPr lvl="1"/>
             <a:r>
-              <a:rPr lang="nl-NL" smtClean="0"/>
+              <a:rPr lang="nl-NL"/>
               <a:t>Tweede niveau</a:t>
             </a:r>
           </a:p>
           <a:p>
             <a:pPr lvl="2"/>
             <a:r>
-              <a:rPr lang="nl-NL" smtClean="0"/>
+              <a:rPr lang="nl-NL"/>
               <a:t>Derde niveau</a:t>
             </a:r>
           </a:p>
           <a:p>
             <a:pPr lvl="3"/>
             <a:r>
-              <a:rPr lang="nl-NL" smtClean="0"/>
+              <a:rPr lang="nl-NL"/>
               <a:t>Vierde niveau</a:t>
             </a:r>
           </a:p>
           <a:p>
             <a:pPr lvl="4"/>
             <a:r>
-              <a:rPr lang="nl-NL" smtClean="0"/>
+              <a:rPr lang="nl-NL"/>
               <a:t>Vijfde niveau</a:t>
             </a:r>
-            <a:endParaRPr lang="nl-NL"/>
           </a:p>
         </p:txBody>
       </p:sp>
@@ -1317,7 +1321,7 @@
           <a:p>
             <a:fld id="{3D636C07-7E76-46D3-B86B-6AF7C60E533E}" type="datetimeFigureOut">
               <a:rPr lang="nl-NL" smtClean="0"/>
-              <a:t>26-10-2017</a:t>
+              <a:t>12-9-2022</a:t>
             </a:fld>
             <a:endParaRPr lang="nl-NL"/>
           </a:p>
@@ -1359,7 +1363,7 @@
           <a:p>
             <a:fld id="{A9096D49-DAE3-40DE-93E0-41688E0A5016}" type="slidenum">
               <a:rPr lang="nl-NL" smtClean="0"/>
-              <a:t>‹nr.›</a:t>
+              <a:t>‹#›</a:t>
             </a:fld>
             <a:endParaRPr lang="nl-NL"/>
           </a:p>
@@ -1410,10 +1414,9 @@
           </a:lstStyle>
           <a:p>
             <a:r>
-              <a:rPr lang="nl-NL" smtClean="0"/>
+              <a:rPr lang="nl-NL"/>
               <a:t>Klik om de stijl te bewerken</a:t>
             </a:r>
-            <a:endParaRPr lang="nl-NL"/>
           </a:p>
         </p:txBody>
       </p:sp>
@@ -1476,7 +1479,7 @@
           <a:p>
             <a:pPr lvl="0"/>
             <a:r>
-              <a:rPr lang="nl-NL" smtClean="0"/>
+              <a:rPr lang="nl-NL"/>
               <a:t>Klik om de modelstijlen te bewerken</a:t>
             </a:r>
           </a:p>
@@ -1532,38 +1535,37 @@
           <a:p>
             <a:pPr lvl="0"/>
             <a:r>
-              <a:rPr lang="nl-NL" smtClean="0"/>
+              <a:rPr lang="nl-NL"/>
               <a:t>Klik om de modelstijlen te bewerken</a:t>
             </a:r>
           </a:p>
           <a:p>
             <a:pPr lvl="1"/>
             <a:r>
-              <a:rPr lang="nl-NL" smtClean="0"/>
+              <a:rPr lang="nl-NL"/>
               <a:t>Tweede niveau</a:t>
             </a:r>
           </a:p>
           <a:p>
             <a:pPr lvl="2"/>
             <a:r>
-              <a:rPr lang="nl-NL" smtClean="0"/>
+              <a:rPr lang="nl-NL"/>
               <a:t>Derde niveau</a:t>
             </a:r>
           </a:p>
           <a:p>
             <a:pPr lvl="3"/>
             <a:r>
-              <a:rPr lang="nl-NL" smtClean="0"/>
+              <a:rPr lang="nl-NL"/>
               <a:t>Vierde niveau</a:t>
             </a:r>
           </a:p>
           <a:p>
             <a:pPr lvl="4"/>
             <a:r>
-              <a:rPr lang="nl-NL" smtClean="0"/>
+              <a:rPr lang="nl-NL"/>
               <a:t>Vijfde niveau</a:t>
             </a:r>
-            <a:endParaRPr lang="nl-NL"/>
           </a:p>
         </p:txBody>
       </p:sp>
@@ -1626,7 +1628,7 @@
           <a:p>
             <a:pPr lvl="0"/>
             <a:r>
-              <a:rPr lang="nl-NL" smtClean="0"/>
+              <a:rPr lang="nl-NL"/>
               <a:t>Klik om de modelstijlen te bewerken</a:t>
             </a:r>
           </a:p>
@@ -1682,38 +1684,37 @@
           <a:p>
             <a:pPr lvl="0"/>
             <a:r>
-              <a:rPr lang="nl-NL" smtClean="0"/>
+              <a:rPr lang="nl-NL"/>
               <a:t>Klik om de modelstijlen te bewerken</a:t>
             </a:r>
           </a:p>
           <a:p>
             <a:pPr lvl="1"/>
             <a:r>
-              <a:rPr lang="nl-NL" smtClean="0"/>
+              <a:rPr lang="nl-NL"/>
               <a:t>Tweede niveau</a:t>
             </a:r>
           </a:p>
           <a:p>
             <a:pPr lvl="2"/>
             <a:r>
-              <a:rPr lang="nl-NL" smtClean="0"/>
+              <a:rPr lang="nl-NL"/>
               <a:t>Derde niveau</a:t>
             </a:r>
           </a:p>
           <a:p>
             <a:pPr lvl="3"/>
             <a:r>
-              <a:rPr lang="nl-NL" smtClean="0"/>
+              <a:rPr lang="nl-NL"/>
               <a:t>Vierde niveau</a:t>
             </a:r>
           </a:p>
           <a:p>
             <a:pPr lvl="4"/>
             <a:r>
-              <a:rPr lang="nl-NL" smtClean="0"/>
+              <a:rPr lang="nl-NL"/>
               <a:t>Vijfde niveau</a:t>
             </a:r>
-            <a:endParaRPr lang="nl-NL"/>
           </a:p>
         </p:txBody>
       </p:sp>
@@ -1734,7 +1735,7 @@
           <a:p>
             <a:fld id="{3D636C07-7E76-46D3-B86B-6AF7C60E533E}" type="datetimeFigureOut">
               <a:rPr lang="nl-NL" smtClean="0"/>
-              <a:t>26-10-2017</a:t>
+              <a:t>12-9-2022</a:t>
             </a:fld>
             <a:endParaRPr lang="nl-NL"/>
           </a:p>
@@ -1776,7 +1777,7 @@
           <a:p>
             <a:fld id="{A9096D49-DAE3-40DE-93E0-41688E0A5016}" type="slidenum">
               <a:rPr lang="nl-NL" smtClean="0"/>
-              <a:t>‹nr.›</a:t>
+              <a:t>‹#›</a:t>
             </a:fld>
             <a:endParaRPr lang="nl-NL"/>
           </a:p>
@@ -1823,10 +1824,9 @@
           <a:lstStyle/>
           <a:p>
             <a:r>
-              <a:rPr lang="nl-NL" smtClean="0"/>
+              <a:rPr lang="nl-NL"/>
               <a:t>Klik om de stijl te bewerken</a:t>
             </a:r>
-            <a:endParaRPr lang="nl-NL"/>
           </a:p>
         </p:txBody>
       </p:sp>
@@ -1847,7 +1847,7 @@
           <a:p>
             <a:fld id="{3D636C07-7E76-46D3-B86B-6AF7C60E533E}" type="datetimeFigureOut">
               <a:rPr lang="nl-NL" smtClean="0"/>
-              <a:t>26-10-2017</a:t>
+              <a:t>12-9-2022</a:t>
             </a:fld>
             <a:endParaRPr lang="nl-NL"/>
           </a:p>
@@ -1889,7 +1889,7 @@
           <a:p>
             <a:fld id="{A9096D49-DAE3-40DE-93E0-41688E0A5016}" type="slidenum">
               <a:rPr lang="nl-NL" smtClean="0"/>
-              <a:t>‹nr.›</a:t>
+              <a:t>‹#›</a:t>
             </a:fld>
             <a:endParaRPr lang="nl-NL"/>
           </a:p>
@@ -1937,7 +1937,7 @@
           <a:p>
             <a:fld id="{3D636C07-7E76-46D3-B86B-6AF7C60E533E}" type="datetimeFigureOut">
               <a:rPr lang="nl-NL" smtClean="0"/>
-              <a:t>26-10-2017</a:t>
+              <a:t>12-9-2022</a:t>
             </a:fld>
             <a:endParaRPr lang="nl-NL"/>
           </a:p>
@@ -1979,7 +1979,7 @@
           <a:p>
             <a:fld id="{A9096D49-DAE3-40DE-93E0-41688E0A5016}" type="slidenum">
               <a:rPr lang="nl-NL" smtClean="0"/>
-              <a:t>‹nr.›</a:t>
+              <a:t>‹#›</a:t>
             </a:fld>
             <a:endParaRPr lang="nl-NL"/>
           </a:p>
@@ -2035,10 +2035,9 @@
           </a:lstStyle>
           <a:p>
             <a:r>
-              <a:rPr lang="nl-NL" smtClean="0"/>
+              <a:rPr lang="nl-NL"/>
               <a:t>Klik om de stijl te bewerken</a:t>
             </a:r>
-            <a:endParaRPr lang="nl-NL"/>
           </a:p>
         </p:txBody>
       </p:sp>
@@ -2092,38 +2091,37 @@
           <a:p>
             <a:pPr lvl="0"/>
             <a:r>
-              <a:rPr lang="nl-NL" smtClean="0"/>
+              <a:rPr lang="nl-NL"/>
               <a:t>Klik om de modelstijlen te bewerken</a:t>
             </a:r>
           </a:p>
           <a:p>
             <a:pPr lvl="1"/>
             <a:r>
-              <a:rPr lang="nl-NL" smtClean="0"/>
+              <a:rPr lang="nl-NL"/>
               <a:t>Tweede niveau</a:t>
             </a:r>
           </a:p>
           <a:p>
             <a:pPr lvl="2"/>
             <a:r>
-              <a:rPr lang="nl-NL" smtClean="0"/>
+              <a:rPr lang="nl-NL"/>
               <a:t>Derde niveau</a:t>
             </a:r>
           </a:p>
           <a:p>
             <a:pPr lvl="3"/>
             <a:r>
-              <a:rPr lang="nl-NL" smtClean="0"/>
+              <a:rPr lang="nl-NL"/>
               <a:t>Vierde niveau</a:t>
             </a:r>
           </a:p>
           <a:p>
             <a:pPr lvl="4"/>
             <a:r>
-              <a:rPr lang="nl-NL" smtClean="0"/>
+              <a:rPr lang="nl-NL"/>
               <a:t>Vijfde niveau</a:t>
             </a:r>
-            <a:endParaRPr lang="nl-NL"/>
           </a:p>
         </p:txBody>
       </p:sp>
@@ -2186,7 +2184,7 @@
           <a:p>
             <a:pPr lvl="0"/>
             <a:r>
-              <a:rPr lang="nl-NL" smtClean="0"/>
+              <a:rPr lang="nl-NL"/>
               <a:t>Klik om de modelstijlen te bewerken</a:t>
             </a:r>
           </a:p>
@@ -2209,7 +2207,7 @@
           <a:p>
             <a:fld id="{3D636C07-7E76-46D3-B86B-6AF7C60E533E}" type="datetimeFigureOut">
               <a:rPr lang="nl-NL" smtClean="0"/>
-              <a:t>26-10-2017</a:t>
+              <a:t>12-9-2022</a:t>
             </a:fld>
             <a:endParaRPr lang="nl-NL"/>
           </a:p>
@@ -2251,7 +2249,7 @@
           <a:p>
             <a:fld id="{A9096D49-DAE3-40DE-93E0-41688E0A5016}" type="slidenum">
               <a:rPr lang="nl-NL" smtClean="0"/>
-              <a:t>‹nr.›</a:t>
+              <a:t>‹#›</a:t>
             </a:fld>
             <a:endParaRPr lang="nl-NL"/>
           </a:p>
@@ -2307,10 +2305,9 @@
           </a:lstStyle>
           <a:p>
             <a:r>
-              <a:rPr lang="nl-NL" smtClean="0"/>
+              <a:rPr lang="nl-NL"/>
               <a:t>Klik om de stijl te bewerken</a:t>
             </a:r>
-            <a:endParaRPr lang="nl-NL"/>
           </a:p>
         </p:txBody>
       </p:sp>
@@ -2434,7 +2431,7 @@
           <a:p>
             <a:pPr lvl="0"/>
             <a:r>
-              <a:rPr lang="nl-NL" smtClean="0"/>
+              <a:rPr lang="nl-NL"/>
               <a:t>Klik om de modelstijlen te bewerken</a:t>
             </a:r>
           </a:p>
@@ -2457,7 +2454,7 @@
           <a:p>
             <a:fld id="{3D636C07-7E76-46D3-B86B-6AF7C60E533E}" type="datetimeFigureOut">
               <a:rPr lang="nl-NL" smtClean="0"/>
-              <a:t>26-10-2017</a:t>
+              <a:t>12-9-2022</a:t>
             </a:fld>
             <a:endParaRPr lang="nl-NL"/>
           </a:p>
@@ -2499,7 +2496,7 @@
           <a:p>
             <a:fld id="{A9096D49-DAE3-40DE-93E0-41688E0A5016}" type="slidenum">
               <a:rPr lang="nl-NL" smtClean="0"/>
-              <a:t>‹nr.›</a:t>
+              <a:t>‹#›</a:t>
             </a:fld>
             <a:endParaRPr lang="nl-NL"/>
           </a:p>
@@ -2561,10 +2558,9 @@
           <a:lstStyle/>
           <a:p>
             <a:r>
-              <a:rPr lang="nl-NL" smtClean="0"/>
+              <a:rPr lang="nl-NL"/>
               <a:t>Klik om de stijl te bewerken</a:t>
             </a:r>
-            <a:endParaRPr lang="nl-NL"/>
           </a:p>
         </p:txBody>
       </p:sp>
@@ -2595,38 +2591,37 @@
           <a:p>
             <a:pPr lvl="0"/>
             <a:r>
-              <a:rPr lang="nl-NL" smtClean="0"/>
+              <a:rPr lang="nl-NL"/>
               <a:t>Klik om de modelstijlen te bewerken</a:t>
             </a:r>
           </a:p>
           <a:p>
             <a:pPr lvl="1"/>
             <a:r>
-              <a:rPr lang="nl-NL" smtClean="0"/>
+              <a:rPr lang="nl-NL"/>
               <a:t>Tweede niveau</a:t>
             </a:r>
           </a:p>
           <a:p>
             <a:pPr lvl="2"/>
             <a:r>
-              <a:rPr lang="nl-NL" smtClean="0"/>
+              <a:rPr lang="nl-NL"/>
               <a:t>Derde niveau</a:t>
             </a:r>
           </a:p>
           <a:p>
             <a:pPr lvl="3"/>
             <a:r>
-              <a:rPr lang="nl-NL" smtClean="0"/>
+              <a:rPr lang="nl-NL"/>
               <a:t>Vierde niveau</a:t>
             </a:r>
           </a:p>
           <a:p>
             <a:pPr lvl="4"/>
             <a:r>
-              <a:rPr lang="nl-NL" smtClean="0"/>
+              <a:rPr lang="nl-NL"/>
               <a:t>Vijfde niveau</a:t>
             </a:r>
-            <a:endParaRPr lang="nl-NL"/>
           </a:p>
         </p:txBody>
       </p:sp>
@@ -2665,7 +2660,7 @@
           <a:p>
             <a:fld id="{3D636C07-7E76-46D3-B86B-6AF7C60E533E}" type="datetimeFigureOut">
               <a:rPr lang="nl-NL" smtClean="0"/>
-              <a:t>26-10-2017</a:t>
+              <a:t>12-9-2022</a:t>
             </a:fld>
             <a:endParaRPr lang="nl-NL"/>
           </a:p>
@@ -2743,7 +2738,7 @@
           <a:p>
             <a:fld id="{A9096D49-DAE3-40DE-93E0-41688E0A5016}" type="slidenum">
               <a:rPr lang="nl-NL" smtClean="0"/>
-              <a:t>‹nr.›</a:t>
+              <a:t>‹#›</a:t>
             </a:fld>
             <a:endParaRPr lang="nl-NL"/>
           </a:p>
@@ -3074,10 +3069,9 @@
           <a:p>
             <a:pPr algn="r"/>
             <a:r>
-              <a:rPr lang="en-GB" dirty="0" smtClean="0"/>
+              <a:rPr lang="en-GB" dirty="0"/>
               <a:t>web server</a:t>
             </a:r>
-            <a:endParaRPr lang="en-GB" dirty="0"/>
           </a:p>
         </p:txBody>
       </p:sp>
@@ -3120,10 +3114,9 @@
           <a:p>
             <a:pPr algn="r"/>
             <a:r>
-              <a:rPr lang="en-GB" dirty="0" smtClean="0"/>
+              <a:rPr lang="en-GB" dirty="0"/>
               <a:t>browser</a:t>
             </a:r>
-            <a:endParaRPr lang="en-GB" dirty="0"/>
           </a:p>
         </p:txBody>
       </p:sp>
@@ -3164,10 +3157,9 @@
           <a:p>
             <a:pPr algn="ctr"/>
             <a:r>
-              <a:rPr lang="en-GB" b="1" dirty="0" smtClean="0"/>
+              <a:rPr lang="en-GB" b="1" dirty="0"/>
               <a:t>PHP interpreter</a:t>
             </a:r>
-            <a:endParaRPr lang="en-GB" b="1" dirty="0"/>
           </a:p>
         </p:txBody>
       </p:sp>
@@ -3219,7 +3211,7 @@
           <a:lstStyle/>
           <a:p>
             <a:r>
-              <a:rPr lang="en-GB" sz="1400" dirty="0" smtClean="0">
+              <a:rPr lang="en-GB" sz="1300" dirty="0">
                 <a:solidFill>
                   <a:schemeClr val="bg2">
                     <a:lumMod val="25000"/>
@@ -3228,7 +3220,9 @@
               </a:rPr>
               <a:t>HTTP request</a:t>
             </a:r>
-            <a:endParaRPr lang="en-GB" sz="1400" dirty="0" smtClean="0">
+          </a:p>
+          <a:p>
+            <a:endParaRPr lang="en-GB" sz="1300" dirty="0">
               <a:solidFill>
                 <a:schemeClr val="bg2">
                   <a:lumMod val="25000"/>
@@ -3237,81 +3231,35 @@
             </a:endParaRPr>
           </a:p>
           <a:p>
-            <a:endParaRPr lang="en-GB" sz="1400" dirty="0">
+            <a:r>
+              <a:rPr lang="en-GB" sz="1100" b="1" dirty="0">
+                <a:solidFill>
+                  <a:schemeClr val="bg2">
+                    <a:lumMod val="25000"/>
+                  </a:schemeClr>
+                </a:solidFill>
+                <a:latin typeface="Consolas" panose="020B0609020204030204" pitchFamily="49" charset="0"/>
+              </a:rPr>
+              <a:t>GET /assets/01/examples/</a:t>
+            </a:r>
+            <a:r>
+              <a:rPr lang="en-GB" sz="1100" b="1" dirty="0" err="1">
+                <a:solidFill>
+                  <a:schemeClr val="bg2">
+                    <a:lumMod val="25000"/>
+                  </a:schemeClr>
+                </a:solidFill>
+                <a:latin typeface="Consolas" panose="020B0609020204030204" pitchFamily="49" charset="0"/>
+              </a:rPr>
+              <a:t>html_and_php.php</a:t>
+            </a:r>
+            <a:endParaRPr lang="en-GB" sz="1100" b="1" dirty="0">
               <a:solidFill>
                 <a:schemeClr val="bg2">
                   <a:lumMod val="25000"/>
                 </a:schemeClr>
               </a:solidFill>
-            </a:endParaRPr>
-          </a:p>
-          <a:p>
-            <a:r>
-              <a:rPr lang="en-GB" sz="1400" b="1" dirty="0" smtClean="0">
-                <a:solidFill>
-                  <a:schemeClr val="bg2">
-                    <a:lumMod val="25000"/>
-                  </a:schemeClr>
-                </a:solidFill>
-              </a:rPr>
-              <a:t>GET /</a:t>
-            </a:r>
-            <a:r>
-              <a:rPr lang="en-GB" sz="1400" b="1" dirty="0" err="1" smtClean="0">
-                <a:solidFill>
-                  <a:schemeClr val="bg2">
-                    <a:lumMod val="25000"/>
-                  </a:schemeClr>
-                </a:solidFill>
-              </a:rPr>
-              <a:t>ws</a:t>
-            </a:r>
-            <a:r>
-              <a:rPr lang="en-GB" sz="1400" b="1" dirty="0" smtClean="0">
-                <a:solidFill>
-                  <a:schemeClr val="bg2">
-                    <a:lumMod val="25000"/>
-                  </a:schemeClr>
-                </a:solidFill>
-              </a:rPr>
-              <a:t>-</a:t>
-            </a:r>
-            <a:r>
-              <a:rPr lang="en-GB" sz="1400" b="1" dirty="0" err="1" smtClean="0">
-                <a:solidFill>
-                  <a:schemeClr val="bg2">
-                    <a:lumMod val="25000"/>
-                  </a:schemeClr>
-                </a:solidFill>
-              </a:rPr>
-              <a:t>ss</a:t>
-            </a:r>
-            <a:r>
-              <a:rPr lang="en-GB" sz="1400" b="1" dirty="0" smtClean="0">
-                <a:solidFill>
-                  <a:schemeClr val="bg2">
-                    <a:lumMod val="25000"/>
-                  </a:schemeClr>
-                </a:solidFill>
-              </a:rPr>
-              <a:t>-course-materials/assets/03/examples/</a:t>
-            </a:r>
-            <a:r>
-              <a:rPr lang="en-GB" sz="1400" b="1" dirty="0" err="1" smtClean="0">
-                <a:solidFill>
-                  <a:schemeClr val="bg2">
-                    <a:lumMod val="25000"/>
-                  </a:schemeClr>
-                </a:solidFill>
-              </a:rPr>
-              <a:t>html_and_php.php</a:t>
-            </a:r>
-            <a:endParaRPr lang="en-GB" sz="1400" b="1" dirty="0" smtClean="0">
-              <a:solidFill>
-                <a:schemeClr val="bg2">
-                  <a:lumMod val="25000"/>
-                </a:schemeClr>
-              </a:solidFill>
+              <a:latin typeface="Consolas" panose="020B0609020204030204" pitchFamily="49" charset="0"/>
             </a:endParaRPr>
           </a:p>
         </p:txBody>
@@ -3364,7 +3312,7 @@
           <a:lstStyle/>
           <a:p>
             <a:r>
-              <a:rPr lang="en-GB" sz="1400" dirty="0" smtClean="0">
+              <a:rPr lang="en-GB" sz="1300" dirty="0">
                 <a:solidFill>
                   <a:schemeClr val="bg2">
                     <a:lumMod val="25000"/>
@@ -3373,7 +3321,9 @@
               </a:rPr>
               <a:t>HTTP response</a:t>
             </a:r>
-            <a:endParaRPr lang="en-GB" sz="1400" dirty="0" smtClean="0">
+          </a:p>
+          <a:p>
+            <a:endParaRPr lang="en-GB" sz="1300" dirty="0">
               <a:solidFill>
                 <a:schemeClr val="bg2">
                   <a:lumMod val="25000"/>
@@ -3382,55 +3332,33 @@
             </a:endParaRPr>
           </a:p>
           <a:p>
-            <a:endParaRPr lang="en-GB" sz="1400" dirty="0">
-              <a:solidFill>
-                <a:schemeClr val="bg2">
-                  <a:lumMod val="25000"/>
-                </a:schemeClr>
-              </a:solidFill>
-            </a:endParaRPr>
-          </a:p>
-          <a:p>
-            <a:r>
-              <a:rPr lang="en-GB" sz="1400" b="1" dirty="0" smtClean="0">
+            <a:r>
+              <a:rPr lang="en-GB" sz="1100" b="1" dirty="0">
                 <a:solidFill>
                   <a:schemeClr val="bg2">
                     <a:lumMod val="25000"/>
                   </a:schemeClr>
                 </a:solidFill>
+                <a:latin typeface="Consolas" panose="020B0609020204030204" pitchFamily="49" charset="0"/>
               </a:rPr>
               <a:t>200 OK</a:t>
             </a:r>
           </a:p>
           <a:p>
             <a:r>
-              <a:rPr lang="nl-BE" sz="1400" dirty="0" smtClean="0">
+              <a:rPr lang="nl-BE" sz="1100" dirty="0">
                 <a:solidFill>
                   <a:schemeClr val="tx1"/>
                 </a:solidFill>
+                <a:latin typeface="Consolas" panose="020B0609020204030204" pitchFamily="49" charset="0"/>
               </a:rPr>
-              <a:t>&lt;!</a:t>
-            </a:r>
-            <a:r>
-              <a:rPr lang="nl-BE" sz="1400" dirty="0">
-                <a:solidFill>
-                  <a:schemeClr val="tx1"/>
-                </a:solidFill>
-              </a:rPr>
-              <a:t>DOCTYPE html&gt; &lt;html</a:t>
-            </a:r>
-            <a:r>
-              <a:rPr lang="nl-BE" sz="1400" dirty="0" smtClean="0">
-                <a:solidFill>
-                  <a:schemeClr val="tx1"/>
-                </a:solidFill>
-              </a:rPr>
-              <a:t>&gt; …</a:t>
-            </a:r>
-            <a:endParaRPr lang="en-GB" sz="1400" dirty="0">
+              <a:t>&lt;!DOCTYPE html&gt; &lt;html&gt; …</a:t>
+            </a:r>
+            <a:endParaRPr lang="en-GB" sz="1100" dirty="0">
               <a:solidFill>
                 <a:schemeClr val="tx1"/>
               </a:solidFill>
+              <a:latin typeface="Consolas" panose="020B0609020204030204" pitchFamily="49" charset="0"/>
             </a:endParaRPr>
           </a:p>
         </p:txBody>
@@ -3505,10 +3433,9 @@
           <a:p>
             <a:pPr algn="ctr"/>
             <a:r>
-              <a:rPr lang="en-GB" b="1" dirty="0" smtClean="0"/>
+              <a:rPr lang="en-GB" b="1" dirty="0"/>
               <a:t>disk</a:t>
             </a:r>
-            <a:endParaRPr lang="en-GB" b="1" dirty="0"/>
           </a:p>
         </p:txBody>
       </p:sp>
@@ -3553,8 +3480,8 @@
         </p:nvSpPr>
         <p:spPr>
           <a:xfrm>
-            <a:off x="5530921" y="1988840"/>
-            <a:ext cx="2064721" cy="528600"/>
+            <a:off x="5292080" y="1988840"/>
+            <a:ext cx="2376264" cy="528600"/>
           </a:xfrm>
           <a:prstGeom prst="roundRect">
             <a:avLst>
@@ -3593,7 +3520,7 @@
           <a:lstStyle/>
           <a:p>
             <a:r>
-              <a:rPr lang="en-GB" sz="1400" b="1" dirty="0" smtClean="0">
+              <a:rPr lang="en-GB" sz="1300" b="1" dirty="0">
                 <a:solidFill>
                   <a:schemeClr val="bg2">
                     <a:lumMod val="25000"/>
@@ -3603,68 +3530,76 @@
               <a:t>File: </a:t>
             </a:r>
             <a:r>
-              <a:rPr lang="en-GB" sz="1400" dirty="0" err="1" smtClean="0">
+              <a:rPr lang="en-GB" sz="1100" dirty="0" err="1">
                 <a:solidFill>
                   <a:schemeClr val="bg2">
                     <a:lumMod val="25000"/>
                   </a:schemeClr>
                 </a:solidFill>
+                <a:latin typeface="Consolas" panose="020B0609020204030204" pitchFamily="49" charset="0"/>
               </a:rPr>
               <a:t>html_and_php.php</a:t>
             </a:r>
-            <a:endParaRPr lang="en-GB" sz="1400" dirty="0" smtClean="0">
+            <a:endParaRPr lang="en-GB" sz="1100" dirty="0">
               <a:solidFill>
                 <a:schemeClr val="bg2">
                   <a:lumMod val="25000"/>
                 </a:schemeClr>
               </a:solidFill>
+              <a:latin typeface="Consolas" panose="020B0609020204030204" pitchFamily="49" charset="0"/>
             </a:endParaRPr>
           </a:p>
           <a:p>
             <a:r>
-              <a:rPr lang="nl-BE" sz="1300" dirty="0" smtClean="0">
+              <a:rPr lang="nl-BE" sz="1100" dirty="0">
                 <a:solidFill>
                   <a:schemeClr val="tx1"/>
                 </a:solidFill>
+                <a:latin typeface="Consolas" panose="020B0609020204030204" pitchFamily="49" charset="0"/>
               </a:rPr>
-              <a:t>… &lt;?</a:t>
-            </a:r>
-            <a:r>
-              <a:rPr lang="nl-BE" sz="1300" dirty="0" err="1" smtClean="0">
+              <a:t>…&lt;?</a:t>
+            </a:r>
+            <a:r>
+              <a:rPr lang="nl-BE" sz="1100" dirty="0" err="1">
                 <a:solidFill>
                   <a:schemeClr val="tx1"/>
                 </a:solidFill>
+                <a:latin typeface="Consolas" panose="020B0609020204030204" pitchFamily="49" charset="0"/>
               </a:rPr>
               <a:t>php</a:t>
             </a:r>
             <a:r>
-              <a:rPr lang="nl-BE" sz="1300" dirty="0" smtClean="0">
+              <a:rPr lang="nl-BE" sz="1100" dirty="0">
                 <a:solidFill>
                   <a:schemeClr val="tx1"/>
                 </a:solidFill>
+                <a:latin typeface="Consolas" panose="020B0609020204030204" pitchFamily="49" charset="0"/>
               </a:rPr>
-              <a:t> echo ‘</a:t>
-            </a:r>
-            <a:r>
-              <a:rPr lang="nl-BE" sz="1300" dirty="0" err="1" smtClean="0">
+              <a:t> echo ‘&lt;p&gt;I </a:t>
+            </a:r>
+            <a:r>
+              <a:rPr lang="nl-BE" sz="1100" dirty="0" err="1">
                 <a:solidFill>
                   <a:schemeClr val="tx1"/>
                 </a:solidFill>
+                <a:latin typeface="Consolas" panose="020B0609020204030204" pitchFamily="49" charset="0"/>
               </a:rPr>
-              <a:t>hello</a:t>
-            </a:r>
-            <a:r>
-              <a:rPr lang="nl-BE" sz="1300" dirty="0" smtClean="0">
+              <a:t>am</a:t>
+            </a:r>
+            <a:r>
+              <a:rPr lang="nl-BE" sz="1100" dirty="0">
                 <a:solidFill>
                   <a:schemeClr val="tx1"/>
                 </a:solidFill>
+                <a:latin typeface="Consolas" panose="020B0609020204030204" pitchFamily="49" charset="0"/>
               </a:rPr>
-              <a:t>’; ?&gt; …</a:t>
-            </a:r>
-            <a:endParaRPr lang="en-GB" sz="1300" dirty="0" smtClean="0">
+              <a:t> …’; ?&gt;…</a:t>
+            </a:r>
+            <a:endParaRPr lang="en-GB" sz="1100" dirty="0">
               <a:solidFill>
                 <a:schemeClr val="tx1"/>
               </a:solidFill>
+              <a:latin typeface="Consolas" panose="020B0609020204030204" pitchFamily="49" charset="0"/>
             </a:endParaRPr>
           </a:p>
           <a:p>
@@ -3686,8 +3621,8 @@
         </p:nvSpPr>
         <p:spPr>
           <a:xfrm>
-            <a:off x="5531615" y="3501008"/>
-            <a:ext cx="2064721" cy="528600"/>
+            <a:off x="5292080" y="3501008"/>
+            <a:ext cx="2376263" cy="528600"/>
           </a:xfrm>
           <a:prstGeom prst="roundRect">
             <a:avLst>
@@ -3726,7 +3661,7 @@
           <a:lstStyle/>
           <a:p>
             <a:r>
-              <a:rPr lang="en-GB" sz="1400" b="1" dirty="0" smtClean="0">
+              <a:rPr lang="en-GB" sz="1400" b="1" dirty="0">
                 <a:solidFill>
                   <a:schemeClr val="bg2">
                     <a:lumMod val="25000"/>
@@ -3735,7 +3670,7 @@
               </a:rPr>
               <a:t>Parsed file</a:t>
             </a:r>
-            <a:endParaRPr lang="en-GB" sz="1400" dirty="0" smtClean="0">
+            <a:endParaRPr lang="en-GB" sz="1400" dirty="0">
               <a:solidFill>
                 <a:schemeClr val="bg2">
                   <a:lumMod val="25000"/>
@@ -3745,33 +3680,37 @@
           </a:p>
           <a:p>
             <a:r>
-              <a:rPr lang="nl-BE" sz="1400" dirty="0" smtClean="0">
+              <a:rPr lang="nl-BE" sz="1100" dirty="0">
                 <a:solidFill>
                   <a:schemeClr val="tx1"/>
                 </a:solidFill>
+                <a:latin typeface="Consolas" panose="020B0609020204030204" pitchFamily="49" charset="0"/>
               </a:rPr>
-              <a:t> … </a:t>
-            </a:r>
-            <a:r>
-              <a:rPr lang="nl-BE" sz="1400" dirty="0" err="1" smtClean="0">
+              <a:t> … &lt;p&gt;I </a:t>
+            </a:r>
+            <a:r>
+              <a:rPr lang="nl-BE" sz="1100" dirty="0" err="1">
                 <a:solidFill>
                   <a:schemeClr val="tx1"/>
                 </a:solidFill>
+                <a:latin typeface="Consolas" panose="020B0609020204030204" pitchFamily="49" charset="0"/>
               </a:rPr>
-              <a:t>hello</a:t>
-            </a:r>
-            <a:r>
-              <a:rPr lang="nl-BE" sz="1400" dirty="0" smtClean="0">
+              <a:t>am</a:t>
+            </a:r>
+            <a:r>
+              <a:rPr lang="nl-BE" sz="1100" dirty="0">
                 <a:solidFill>
                   <a:schemeClr val="tx1"/>
                 </a:solidFill>
+                <a:latin typeface="Consolas" panose="020B0609020204030204" pitchFamily="49" charset="0"/>
               </a:rPr>
               <a:t> …</a:t>
             </a:r>
-            <a:endParaRPr lang="en-GB" sz="1400" dirty="0" smtClean="0">
+            <a:endParaRPr lang="en-GB" sz="1100" dirty="0">
               <a:solidFill>
                 <a:schemeClr val="tx1"/>
               </a:solidFill>
+              <a:latin typeface="Consolas" panose="020B0609020204030204" pitchFamily="49" charset="0"/>
             </a:endParaRPr>
           </a:p>
           <a:p>
@@ -3894,13 +3833,6 @@
   <p:clrMapOvr>
     <a:masterClrMapping/>
   </p:clrMapOvr>
-  <p:timing>
-    <p:tnLst>
-      <p:par>
-        <p:cTn id="1" dur="indefinite" restart="never" nodeType="tmRoot"/>
-      </p:par>
-    </p:tnLst>
-  </p:timing>
 </p:sld>
 </file>
 

</xml_diff>